<commit_message>
Feedback from Mini Xp Days
</commit_message>
<xml_diff>
--- a/Slides/20100426_MiniXpDays_AgileAcceptanceTesting.pptx
+++ b/Slides/20100426_MiniXpDays_AgileAcceptanceTesting.pptx
@@ -224,7 +224,7 @@
             <a:fld id="{7E752524-4858-4B26-B945-9A6E6F77C137}" type="datetimeFigureOut">
               <a:rPr lang="nl-BE" smtClean="0"/>
               <a:pPr/>
-              <a:t>24/04/2010</a:t>
+              <a:t>26/04/2010</a:t>
             </a:fld>
             <a:endParaRPr lang="nl-BE"/>
           </a:p>
@@ -386,7 +386,7 @@
             <a:fld id="{08F0785E-033A-43CD-AF7D-1A09C6890A39}" type="datetimeFigureOut">
               <a:rPr lang="nl-BE" smtClean="0"/>
               <a:pPr/>
-              <a:t>24/04/2010</a:t>
+              <a:t>26/04/2010</a:t>
             </a:fld>
             <a:endParaRPr lang="nl-BE"/>
           </a:p>
@@ -4863,7 +4863,7 @@
             <a:fld id="{FB938823-3E05-40BA-BF51-A1BB5DC0A85F}" type="datetimeFigureOut">
               <a:rPr lang="nl-BE" smtClean="0"/>
               <a:pPr/>
-              <a:t>24/04/2010</a:t>
+              <a:t>26/04/2010</a:t>
             </a:fld>
             <a:endParaRPr lang="nl-BE"/>
           </a:p>
@@ -5061,7 +5061,7 @@
             <a:fld id="{FB938823-3E05-40BA-BF51-A1BB5DC0A85F}" type="datetimeFigureOut">
               <a:rPr lang="nl-BE" smtClean="0"/>
               <a:pPr/>
-              <a:t>24/04/2010</a:t>
+              <a:t>26/04/2010</a:t>
             </a:fld>
             <a:endParaRPr lang="nl-BE"/>
           </a:p>
@@ -5248,7 +5248,7 @@
             <a:fld id="{FB938823-3E05-40BA-BF51-A1BB5DC0A85F}" type="datetimeFigureOut">
               <a:rPr lang="nl-BE" smtClean="0"/>
               <a:pPr/>
-              <a:t>24/04/2010</a:t>
+              <a:t>26/04/2010</a:t>
             </a:fld>
             <a:endParaRPr lang="nl-BE"/>
           </a:p>
@@ -5400,7 +5400,7 @@
             <a:fld id="{FB938823-3E05-40BA-BF51-A1BB5DC0A85F}" type="datetimeFigureOut">
               <a:rPr lang="nl-BE" smtClean="0"/>
               <a:pPr/>
-              <a:t>24/04/2010</a:t>
+              <a:t>26/04/2010</a:t>
             </a:fld>
             <a:endParaRPr lang="nl-BE"/>
           </a:p>
@@ -5657,7 +5657,7 @@
             <a:fld id="{FB938823-3E05-40BA-BF51-A1BB5DC0A85F}" type="datetimeFigureOut">
               <a:rPr lang="nl-BE" smtClean="0"/>
               <a:pPr/>
-              <a:t>24/04/2010</a:t>
+              <a:t>26/04/2010</a:t>
             </a:fld>
             <a:endParaRPr lang="nl-BE"/>
           </a:p>
@@ -6068,7 +6068,7 @@
             <a:fld id="{FB938823-3E05-40BA-BF51-A1BB5DC0A85F}" type="datetimeFigureOut">
               <a:rPr lang="nl-BE" smtClean="0"/>
               <a:pPr/>
-              <a:t>24/04/2010</a:t>
+              <a:t>26/04/2010</a:t>
             </a:fld>
             <a:endParaRPr lang="nl-BE"/>
           </a:p>
@@ -6516,7 +6516,7 @@
             <a:fld id="{FB938823-3E05-40BA-BF51-A1BB5DC0A85F}" type="datetimeFigureOut">
               <a:rPr lang="nl-BE" smtClean="0"/>
               <a:pPr/>
-              <a:t>24/04/2010</a:t>
+              <a:t>26/04/2010</a:t>
             </a:fld>
             <a:endParaRPr lang="nl-BE"/>
           </a:p>
@@ -6619,7 +6619,7 @@
             <a:fld id="{FB938823-3E05-40BA-BF51-A1BB5DC0A85F}" type="datetimeFigureOut">
               <a:rPr lang="nl-BE" smtClean="0"/>
               <a:pPr/>
-              <a:t>24/04/2010</a:t>
+              <a:t>26/04/2010</a:t>
             </a:fld>
             <a:endParaRPr lang="nl-BE"/>
           </a:p>
@@ -6742,7 +6742,7 @@
             <a:fld id="{FB938823-3E05-40BA-BF51-A1BB5DC0A85F}" type="datetimeFigureOut">
               <a:rPr lang="nl-BE" smtClean="0"/>
               <a:pPr/>
-              <a:t>24/04/2010</a:t>
+              <a:t>26/04/2010</a:t>
             </a:fld>
             <a:endParaRPr lang="nl-BE"/>
           </a:p>
@@ -7018,7 +7018,7 @@
             <a:fld id="{FB938823-3E05-40BA-BF51-A1BB5DC0A85F}" type="datetimeFigureOut">
               <a:rPr lang="nl-BE" smtClean="0"/>
               <a:pPr/>
-              <a:t>24/04/2010</a:t>
+              <a:t>26/04/2010</a:t>
             </a:fld>
             <a:endParaRPr lang="nl-BE"/>
           </a:p>
@@ -7225,7 +7225,7 @@
             <a:fld id="{FB938823-3E05-40BA-BF51-A1BB5DC0A85F}" type="datetimeFigureOut">
               <a:rPr lang="nl-BE" smtClean="0"/>
               <a:pPr/>
-              <a:t>24/04/2010</a:t>
+              <a:t>26/04/2010</a:t>
             </a:fld>
             <a:endParaRPr lang="nl-BE"/>
           </a:p>
@@ -8336,7 +8336,7 @@
             <a:fld id="{FB938823-3E05-40BA-BF51-A1BB5DC0A85F}" type="datetimeFigureOut">
               <a:rPr lang="nl-BE" smtClean="0"/>
               <a:pPr/>
-              <a:t>24/04/2010</a:t>
+              <a:t>26/04/2010</a:t>
             </a:fld>
             <a:endParaRPr lang="nl-BE"/>
           </a:p>
@@ -15028,8 +15028,8 @@
           </p:nvSpPr>
           <p:spPr>
             <a:xfrm rot="21346941">
-              <a:off x="890871" y="1257165"/>
-              <a:ext cx="1040670" cy="830997"/>
+              <a:off x="609547" y="1257165"/>
+              <a:ext cx="1603324" cy="830997"/>
             </a:xfrm>
             <a:prstGeom prst="rect">
               <a:avLst/>
@@ -15044,13 +15044,14 @@
             <a:p>
               <a:r>
                 <a:rPr lang="nl-BE" sz="2400" dirty="0" smtClean="0"/>
-                <a:t>Keep</a:t>
+                <a:t>What’s in</a:t>
               </a:r>
-            </a:p>
-            <a:p>
+              <a:br>
+                <a:rPr lang="nl-BE" sz="2400" dirty="0" smtClean="0"/>
+              </a:br>
               <a:r>
                 <a:rPr lang="nl-BE" sz="2400" dirty="0" smtClean="0"/>
-                <a:t>doing</a:t>
+                <a:t>it for me?</a:t>
               </a:r>
               <a:endParaRPr lang="nl-BE" sz="2400" dirty="0"/>
             </a:p>
@@ -15064,8 +15065,8 @@
           </p:nvSpPr>
           <p:spPr>
             <a:xfrm rot="21193017">
-              <a:off x="1593805" y="586735"/>
-              <a:ext cx="612668" cy="307777"/>
+              <a:off x="1424259" y="586735"/>
+              <a:ext cx="550151" cy="307777"/>
             </a:xfrm>
             <a:prstGeom prst="rect">
               <a:avLst/>
@@ -15080,8 +15081,9 @@
             <a:p>
               <a:r>
                 <a:rPr lang="nl-BE" sz="1400" dirty="0" smtClean="0"/>
-                <a:t>Keep</a:t>
+                <a:t>4ME</a:t>
               </a:r>
+              <a:endParaRPr lang="nl-BE" sz="1400" dirty="0" smtClean="0"/>
             </a:p>
           </p:txBody>
         </p:sp>
@@ -15093,7 +15095,7 @@
           </p:nvCxnSpPr>
           <p:spPr>
             <a:xfrm rot="16200000" flipH="1">
-              <a:off x="1428728" y="714356"/>
+              <a:off x="1000100" y="785793"/>
               <a:ext cx="357190" cy="71438"/>
             </a:xfrm>
             <a:prstGeom prst="line">
@@ -15123,8 +15125,8 @@
           </p:nvCxnSpPr>
           <p:spPr>
             <a:xfrm flipV="1">
-              <a:off x="1643042" y="857232"/>
-              <a:ext cx="571504" cy="71438"/>
+              <a:off x="1214414" y="857232"/>
+              <a:ext cx="1000132" cy="142876"/>
             </a:xfrm>
             <a:prstGeom prst="line">
               <a:avLst/>
@@ -15192,8 +15194,8 @@
           </p:nvSpPr>
           <p:spPr>
             <a:xfrm rot="21346941">
-              <a:off x="890871" y="1257165"/>
-              <a:ext cx="1040670" cy="830997"/>
+              <a:off x="588706" y="1072499"/>
+              <a:ext cx="1645002" cy="1200329"/>
             </a:xfrm>
             <a:prstGeom prst="rect">
               <a:avLst/>
@@ -15208,15 +15210,23 @@
             <a:p>
               <a:r>
                 <a:rPr lang="nl-BE" sz="2400" dirty="0" smtClean="0"/>
-                <a:t>Stop</a:t>
+                <a:t>Will do</a:t>
               </a:r>
-            </a:p>
-            <a:p>
+              <a:br>
+                <a:rPr lang="nl-BE" sz="2400" dirty="0" smtClean="0"/>
+              </a:br>
               <a:r>
                 <a:rPr lang="nl-BE" sz="2400" dirty="0" smtClean="0"/>
-                <a:t>doing</a:t>
+                <a:t>tomorrow</a:t>
               </a:r>
-              <a:endParaRPr lang="nl-BE" sz="2400" dirty="0"/>
+              <a:br>
+                <a:rPr lang="nl-BE" sz="2400" dirty="0" smtClean="0"/>
+              </a:br>
+              <a:r>
+                <a:rPr lang="nl-BE" sz="2400" dirty="0" smtClean="0"/>
+                <a:t>...</a:t>
+              </a:r>
+              <a:endParaRPr lang="nl-BE" sz="2400" dirty="0" smtClean="0"/>
             </a:p>
           </p:txBody>
         </p:sp>
@@ -15228,8 +15238,8 @@
           </p:nvSpPr>
           <p:spPr>
             <a:xfrm rot="21193017">
-              <a:off x="1614644" y="586735"/>
-              <a:ext cx="570990" cy="307777"/>
+              <a:off x="1203429" y="586735"/>
+              <a:ext cx="1083951" cy="307777"/>
             </a:xfrm>
             <a:prstGeom prst="rect">
               <a:avLst/>
@@ -15244,8 +15254,9 @@
             <a:p>
               <a:r>
                 <a:rPr lang="nl-BE" sz="1400" dirty="0" smtClean="0"/>
-                <a:t>Stop</a:t>
+                <a:t>Tomorrow</a:t>
               </a:r>
+              <a:endParaRPr lang="nl-BE" sz="1400" dirty="0" smtClean="0"/>
             </a:p>
           </p:txBody>
         </p:sp>
@@ -15257,7 +15268,7 @@
           </p:nvCxnSpPr>
           <p:spPr>
             <a:xfrm rot="16200000" flipH="1">
-              <a:off x="1428728" y="714356"/>
+              <a:off x="974732" y="785770"/>
               <a:ext cx="357190" cy="71438"/>
             </a:xfrm>
             <a:prstGeom prst="line">
@@ -15287,8 +15298,8 @@
           </p:nvCxnSpPr>
           <p:spPr>
             <a:xfrm flipV="1">
-              <a:off x="1643042" y="857232"/>
-              <a:ext cx="571504" cy="71438"/>
+              <a:off x="1189046" y="857232"/>
+              <a:ext cx="1025500" cy="142852"/>
             </a:xfrm>
             <a:prstGeom prst="line">
               <a:avLst/>
@@ -15356,8 +15367,8 @@
           </p:nvSpPr>
           <p:spPr>
             <a:xfrm rot="21346941">
-              <a:off x="872438" y="1257165"/>
-              <a:ext cx="1077539" cy="830997"/>
+              <a:off x="683284" y="1257165"/>
+              <a:ext cx="1455848" cy="830997"/>
             </a:xfrm>
             <a:prstGeom prst="rect">
               <a:avLst/>
@@ -15372,13 +15383,14 @@
             <a:p>
               <a:r>
                 <a:rPr lang="nl-BE" sz="2400" dirty="0" smtClean="0"/>
-                <a:t>Start </a:t>
+                <a:t>What’s</a:t>
               </a:r>
-            </a:p>
-            <a:p>
+              <a:br>
+                <a:rPr lang="nl-BE" sz="2400" dirty="0" smtClean="0"/>
+              </a:br>
               <a:r>
                 <a:rPr lang="nl-BE" sz="2400" dirty="0" smtClean="0"/>
-                <a:t>Doing</a:t>
+                <a:t>Missing?</a:t>
               </a:r>
               <a:endParaRPr lang="nl-BE" sz="2400" dirty="0"/>
             </a:p>
@@ -15392,8 +15404,8 @@
           </p:nvSpPr>
           <p:spPr>
             <a:xfrm rot="21193017">
-              <a:off x="1605828" y="586735"/>
-              <a:ext cx="588623" cy="307777"/>
+              <a:off x="1422468" y="620500"/>
+              <a:ext cx="848309" cy="307777"/>
             </a:xfrm>
             <a:prstGeom prst="rect">
               <a:avLst/>
@@ -15408,8 +15420,9 @@
             <a:p>
               <a:r>
                 <a:rPr lang="nl-BE" sz="1400" dirty="0" smtClean="0"/>
-                <a:t>Start</a:t>
+                <a:t>Missing</a:t>
               </a:r>
+              <a:endParaRPr lang="nl-BE" sz="1400" dirty="0" smtClean="0"/>
             </a:p>
           </p:txBody>
         </p:sp>
@@ -15421,8 +15434,8 @@
           </p:nvCxnSpPr>
           <p:spPr>
             <a:xfrm rot="16200000" flipH="1">
-              <a:off x="1428728" y="714356"/>
-              <a:ext cx="357190" cy="71438"/>
+              <a:off x="1321571" y="750075"/>
+              <a:ext cx="285752" cy="71438"/>
             </a:xfrm>
             <a:prstGeom prst="line">
               <a:avLst/>
@@ -15451,172 +15464,8 @@
           </p:nvCxnSpPr>
           <p:spPr>
             <a:xfrm flipV="1">
-              <a:off x="1643042" y="857232"/>
-              <a:ext cx="571504" cy="71438"/>
-            </a:xfrm>
-            <a:prstGeom prst="line">
-              <a:avLst/>
-            </a:prstGeom>
-          </p:spPr>
-          <p:style>
-            <a:lnRef idx="1">
-              <a:schemeClr val="accent1"/>
-            </a:lnRef>
-            <a:fillRef idx="0">
-              <a:schemeClr val="accent1"/>
-            </a:fillRef>
-            <a:effectRef idx="0">
-              <a:schemeClr val="accent1"/>
-            </a:effectRef>
-            <a:fontRef idx="minor">
-              <a:schemeClr val="tx1"/>
-            </a:fontRef>
-          </p:style>
-        </p:cxnSp>
-      </p:grpSp>
-      <p:grpSp>
-        <p:nvGrpSpPr>
-          <p:cNvPr id="6" name="Group 39"/>
-          <p:cNvGrpSpPr/>
-          <p:nvPr/>
-        </p:nvGrpSpPr>
-        <p:grpSpPr>
-          <a:xfrm>
-            <a:off x="6169004" y="4071942"/>
-            <a:ext cx="2974996" cy="2621142"/>
-            <a:chOff x="-214346" y="285728"/>
-            <a:chExt cx="2974996" cy="2621142"/>
-          </a:xfrm>
-        </p:grpSpPr>
-        <p:pic>
-          <p:nvPicPr>
-            <p:cNvPr id="41" name="Picture 40" descr="686memo_sticky.jpg"/>
-            <p:cNvPicPr>
-              <a:picLocks noChangeAspect="1"/>
-            </p:cNvPicPr>
-            <p:nvPr/>
-          </p:nvPicPr>
-          <p:blipFill>
-            <a:blip r:embed="rId3" cstate="print"/>
-            <a:stretch>
-              <a:fillRect/>
-            </a:stretch>
-          </p:blipFill>
-          <p:spPr>
-            <a:xfrm>
-              <a:off x="-214346" y="285728"/>
-              <a:ext cx="2974996" cy="2621142"/>
-            </a:xfrm>
-            <a:prstGeom prst="rect">
-              <a:avLst/>
-            </a:prstGeom>
-          </p:spPr>
-        </p:pic>
-        <p:sp>
-          <p:nvSpPr>
-            <p:cNvPr id="42" name="TextBox 41"/>
-            <p:cNvSpPr txBox="1"/>
-            <p:nvPr/>
-          </p:nvSpPr>
-          <p:spPr>
-            <a:xfrm rot="21346941">
-              <a:off x="568668" y="1257165"/>
-              <a:ext cx="1685077" cy="830997"/>
-            </a:xfrm>
-            <a:prstGeom prst="rect">
-              <a:avLst/>
-            </a:prstGeom>
-            <a:noFill/>
-          </p:spPr>
-          <p:txBody>
-            <a:bodyPr wrap="none" rtlCol="0">
-              <a:spAutoFit/>
-            </a:bodyPr>
-            <a:lstStyle/>
-            <a:p>
-              <a:r>
-                <a:rPr lang="nl-BE" sz="2400" dirty="0" smtClean="0"/>
-                <a:t>What’s in</a:t>
-              </a:r>
-            </a:p>
-            <a:p>
-              <a:r>
-                <a:rPr lang="nl-BE" sz="2400" dirty="0" smtClean="0"/>
-                <a:t>it for you?</a:t>
-              </a:r>
-              <a:endParaRPr lang="nl-BE" sz="2400" dirty="0"/>
-            </a:p>
-          </p:txBody>
-        </p:sp>
-        <p:sp>
-          <p:nvSpPr>
-            <p:cNvPr id="43" name="TextBox 42"/>
-            <p:cNvSpPr txBox="1"/>
-            <p:nvPr/>
-          </p:nvSpPr>
-          <p:spPr>
-            <a:xfrm rot="21193017">
-              <a:off x="1625064" y="586735"/>
-              <a:ext cx="550151" cy="307777"/>
-            </a:xfrm>
-            <a:prstGeom prst="rect">
-              <a:avLst/>
-            </a:prstGeom>
-            <a:noFill/>
-          </p:spPr>
-          <p:txBody>
-            <a:bodyPr wrap="none" rtlCol="0">
-              <a:spAutoFit/>
-            </a:bodyPr>
-            <a:lstStyle/>
-            <a:p>
-              <a:r>
-                <a:rPr lang="nl-BE" sz="1400" dirty="0" smtClean="0"/>
-                <a:t>4ME</a:t>
-              </a:r>
-            </a:p>
-          </p:txBody>
-        </p:sp>
-        <p:cxnSp>
-          <p:nvCxnSpPr>
-            <p:cNvPr id="44" name="Straight Connector 43"/>
-            <p:cNvCxnSpPr/>
-            <p:nvPr/>
-          </p:nvCxnSpPr>
-          <p:spPr>
-            <a:xfrm rot="16200000" flipH="1">
-              <a:off x="1428728" y="714356"/>
-              <a:ext cx="357190" cy="71438"/>
-            </a:xfrm>
-            <a:prstGeom prst="line">
-              <a:avLst/>
-            </a:prstGeom>
-          </p:spPr>
-          <p:style>
-            <a:lnRef idx="1">
-              <a:schemeClr val="accent1"/>
-            </a:lnRef>
-            <a:fillRef idx="0">
-              <a:schemeClr val="accent1"/>
-            </a:fillRef>
-            <a:effectRef idx="0">
-              <a:schemeClr val="accent1"/>
-            </a:effectRef>
-            <a:fontRef idx="minor">
-              <a:schemeClr val="tx1"/>
-            </a:fontRef>
-          </p:style>
-        </p:cxnSp>
-        <p:cxnSp>
-          <p:nvCxnSpPr>
-            <p:cNvPr id="45" name="Straight Connector 44"/>
-            <p:cNvCxnSpPr/>
-            <p:nvPr/>
-          </p:nvCxnSpPr>
-          <p:spPr>
-            <a:xfrm flipV="1">
-              <a:off x="1643042" y="857232"/>
-              <a:ext cx="571504" cy="71438"/>
+              <a:off x="1500166" y="857232"/>
+              <a:ext cx="714380" cy="71438"/>
             </a:xfrm>
             <a:prstGeom prst="line">
               <a:avLst/>
@@ -15800,51 +15649,6 @@
                                         </p:cTn>
                                         <p:tgtEl>
                                           <p:spTgt spid="5"/>
-                                        </p:tgtEl>
-                                        <p:attrNameLst>
-                                          <p:attrName>style.visibility</p:attrName>
-                                        </p:attrNameLst>
-                                      </p:cBhvr>
-                                      <p:to>
-                                        <p:strVal val="visible"/>
-                                      </p:to>
-                                    </p:set>
-                                  </p:childTnLst>
-                                </p:cTn>
-                              </p:par>
-                            </p:childTnLst>
-                          </p:cTn>
-                        </p:par>
-                      </p:childTnLst>
-                    </p:cTn>
-                  </p:par>
-                  <p:par>
-                    <p:cTn id="15" fill="hold">
-                      <p:stCondLst>
-                        <p:cond delay="indefinite"/>
-                      </p:stCondLst>
-                      <p:childTnLst>
-                        <p:par>
-                          <p:cTn id="16" fill="hold">
-                            <p:stCondLst>
-                              <p:cond delay="0"/>
-                            </p:stCondLst>
-                            <p:childTnLst>
-                              <p:par>
-                                <p:cTn id="17" presetID="1" presetClass="entr" presetSubtype="0" fill="hold" nodeType="clickEffect">
-                                  <p:stCondLst>
-                                    <p:cond delay="0"/>
-                                  </p:stCondLst>
-                                  <p:childTnLst>
-                                    <p:set>
-                                      <p:cBhvr>
-                                        <p:cTn id="18" dur="1" fill="hold">
-                                          <p:stCondLst>
-                                            <p:cond delay="0"/>
-                                          </p:stCondLst>
-                                        </p:cTn>
-                                        <p:tgtEl>
-                                          <p:spTgt spid="6"/>
                                         </p:tgtEl>
                                         <p:attrNameLst>
                                           <p:attrName>style.visibility</p:attrName>

</xml_diff>